<commit_message>
finale Version nochmal aktulisiert
</commit_message>
<xml_diff>
--- a/Antrittspräsentation_final.pptx
+++ b/Antrittspräsentation_final.pptx
@@ -18,7 +18,7 @@
     <p:sldId id="273" r:id="rId9"/>
     <p:sldId id="261" r:id="rId10"/>
     <p:sldId id="262" r:id="rId11"/>
-    <p:sldId id="274" r:id="rId12"/>
+    <p:sldId id="283" r:id="rId12"/>
     <p:sldId id="281" r:id="rId13"/>
     <p:sldId id="264" r:id="rId14"/>
     <p:sldId id="276" r:id="rId15"/>
@@ -126,13 +126,13 @@
   </p:defaultTextStyle>
   <p:extLst>
     <p:ext uri="{EFAFB233-063F-42B5-8137-9DF3F51BA10A}">
-      <p15:sldGuideLst xmlns:p15="http://schemas.microsoft.com/office/powerpoint/2012/main" xmlns="">
-        <p15:guide id="1" orient="horz" pos="2115" userDrawn="1">
+      <p15:sldGuideLst xmlns:p15="http://schemas.microsoft.com/office/powerpoint/2012/main">
+        <p15:guide id="1" orient="horz" pos="2137" userDrawn="1">
           <p15:clr>
             <a:srgbClr val="A4A3A4"/>
           </p15:clr>
         </p15:guide>
-        <p15:guide id="2" pos="2880" userDrawn="1">
+        <p15:guide id="2" pos="2857" userDrawn="1">
           <p15:clr>
             <a:srgbClr val="A4A3A4"/>
           </p15:clr>
@@ -386,7 +386,7 @@
             <a:fld id="{6E317588-5DE5-4B62-953B-742D2484B4CB}" type="slidenum">
               <a:rPr lang="de-DE" smtClean="0"/>
               <a:pPr/>
-              <a:t>‹#›</a:t>
+              <a:t>‹Nr.›</a:t>
             </a:fld>
             <a:endParaRPr lang="de-DE"/>
           </a:p>
@@ -395,7 +395,7 @@
     </p:spTree>
     <p:extLst>
       <p:ext uri="{BB962C8B-B14F-4D97-AF65-F5344CB8AC3E}">
-        <p14:creationId xmlns:p14="http://schemas.microsoft.com/office/powerpoint/2010/main" xmlns="" val="571498403"/>
+        <p14:creationId xmlns:p14="http://schemas.microsoft.com/office/powerpoint/2010/main" val="571498403"/>
       </p:ext>
     </p:extLst>
   </p:cSld>
@@ -570,7 +570,7 @@
     </p:spTree>
     <p:extLst>
       <p:ext uri="{BB962C8B-B14F-4D97-AF65-F5344CB8AC3E}">
-        <p14:creationId xmlns:p14="http://schemas.microsoft.com/office/powerpoint/2010/main" xmlns="" val="1311940268"/>
+        <p14:creationId xmlns:p14="http://schemas.microsoft.com/office/powerpoint/2010/main" val="1311940268"/>
       </p:ext>
     </p:extLst>
   </p:cSld>
@@ -655,7 +655,7 @@
     </p:spTree>
     <p:extLst>
       <p:ext uri="{BB962C8B-B14F-4D97-AF65-F5344CB8AC3E}">
-        <p14:creationId xmlns:p14="http://schemas.microsoft.com/office/powerpoint/2010/main" xmlns="" val="2649597596"/>
+        <p14:creationId xmlns:p14="http://schemas.microsoft.com/office/powerpoint/2010/main" val="2790860751"/>
       </p:ext>
     </p:extLst>
   </p:cSld>
@@ -748,7 +748,7 @@
     </p:spTree>
     <p:extLst>
       <p:ext uri="{BB962C8B-B14F-4D97-AF65-F5344CB8AC3E}">
-        <p14:creationId xmlns:p14="http://schemas.microsoft.com/office/powerpoint/2010/main" xmlns="" val="4198455714"/>
+        <p14:creationId xmlns:p14="http://schemas.microsoft.com/office/powerpoint/2010/main" val="4198455714"/>
       </p:ext>
     </p:extLst>
   </p:cSld>
@@ -833,7 +833,7 @@
     </p:spTree>
     <p:extLst>
       <p:ext uri="{BB962C8B-B14F-4D97-AF65-F5344CB8AC3E}">
-        <p14:creationId xmlns:p14="http://schemas.microsoft.com/office/powerpoint/2010/main" xmlns="" val="1546618358"/>
+        <p14:creationId xmlns:p14="http://schemas.microsoft.com/office/powerpoint/2010/main" val="1546618358"/>
       </p:ext>
     </p:extLst>
   </p:cSld>
@@ -918,7 +918,7 @@
     </p:spTree>
     <p:extLst>
       <p:ext uri="{BB962C8B-B14F-4D97-AF65-F5344CB8AC3E}">
-        <p14:creationId xmlns:p14="http://schemas.microsoft.com/office/powerpoint/2010/main" xmlns="" val="2736365878"/>
+        <p14:creationId xmlns:p14="http://schemas.microsoft.com/office/powerpoint/2010/main" val="2736365878"/>
       </p:ext>
     </p:extLst>
   </p:cSld>
@@ -1003,7 +1003,7 @@
     </p:spTree>
     <p:extLst>
       <p:ext uri="{BB962C8B-B14F-4D97-AF65-F5344CB8AC3E}">
-        <p14:creationId xmlns:p14="http://schemas.microsoft.com/office/powerpoint/2010/main" xmlns="" val="2409038211"/>
+        <p14:creationId xmlns:p14="http://schemas.microsoft.com/office/powerpoint/2010/main" val="2409038211"/>
       </p:ext>
     </p:extLst>
   </p:cSld>
@@ -1088,7 +1088,7 @@
     </p:spTree>
     <p:extLst>
       <p:ext uri="{BB962C8B-B14F-4D97-AF65-F5344CB8AC3E}">
-        <p14:creationId xmlns:p14="http://schemas.microsoft.com/office/powerpoint/2010/main" xmlns="" val="1739506376"/>
+        <p14:creationId xmlns:p14="http://schemas.microsoft.com/office/powerpoint/2010/main" val="1739506376"/>
       </p:ext>
     </p:extLst>
   </p:cSld>
@@ -1173,7 +1173,7 @@
     </p:spTree>
     <p:extLst>
       <p:ext uri="{BB962C8B-B14F-4D97-AF65-F5344CB8AC3E}">
-        <p14:creationId xmlns:p14="http://schemas.microsoft.com/office/powerpoint/2010/main" xmlns="" val="473473196"/>
+        <p14:creationId xmlns:p14="http://schemas.microsoft.com/office/powerpoint/2010/main" val="473473196"/>
       </p:ext>
     </p:extLst>
   </p:cSld>
@@ -1258,7 +1258,7 @@
     </p:spTree>
     <p:extLst>
       <p:ext uri="{BB962C8B-B14F-4D97-AF65-F5344CB8AC3E}">
-        <p14:creationId xmlns:p14="http://schemas.microsoft.com/office/powerpoint/2010/main" xmlns="" val="4167058987"/>
+        <p14:creationId xmlns:p14="http://schemas.microsoft.com/office/powerpoint/2010/main" val="4167058987"/>
       </p:ext>
     </p:extLst>
   </p:cSld>
@@ -1343,7 +1343,7 @@
     </p:spTree>
     <p:extLst>
       <p:ext uri="{BB962C8B-B14F-4D97-AF65-F5344CB8AC3E}">
-        <p14:creationId xmlns:p14="http://schemas.microsoft.com/office/powerpoint/2010/main" xmlns="" val="100049160"/>
+        <p14:creationId xmlns:p14="http://schemas.microsoft.com/office/powerpoint/2010/main" val="100049160"/>
       </p:ext>
     </p:extLst>
   </p:cSld>
@@ -1428,7 +1428,7 @@
     </p:spTree>
     <p:extLst>
       <p:ext uri="{BB962C8B-B14F-4D97-AF65-F5344CB8AC3E}">
-        <p14:creationId xmlns:p14="http://schemas.microsoft.com/office/powerpoint/2010/main" xmlns="" val="691411312"/>
+        <p14:creationId xmlns:p14="http://schemas.microsoft.com/office/powerpoint/2010/main" val="691411312"/>
       </p:ext>
     </p:extLst>
   </p:cSld>
@@ -1513,7 +1513,7 @@
     </p:spTree>
     <p:extLst>
       <p:ext uri="{BB962C8B-B14F-4D97-AF65-F5344CB8AC3E}">
-        <p14:creationId xmlns:p14="http://schemas.microsoft.com/office/powerpoint/2010/main" xmlns="" val="1509519733"/>
+        <p14:creationId xmlns:p14="http://schemas.microsoft.com/office/powerpoint/2010/main" val="1509519733"/>
       </p:ext>
     </p:extLst>
   </p:cSld>
@@ -1598,7 +1598,7 @@
     </p:spTree>
     <p:extLst>
       <p:ext uri="{BB962C8B-B14F-4D97-AF65-F5344CB8AC3E}">
-        <p14:creationId xmlns:p14="http://schemas.microsoft.com/office/powerpoint/2010/main" xmlns="" val="554876219"/>
+        <p14:creationId xmlns:p14="http://schemas.microsoft.com/office/powerpoint/2010/main" val="554876219"/>
       </p:ext>
     </p:extLst>
   </p:cSld>
@@ -1683,7 +1683,7 @@
     </p:spTree>
     <p:extLst>
       <p:ext uri="{BB962C8B-B14F-4D97-AF65-F5344CB8AC3E}">
-        <p14:creationId xmlns:p14="http://schemas.microsoft.com/office/powerpoint/2010/main" xmlns="" val="3677194970"/>
+        <p14:creationId xmlns:p14="http://schemas.microsoft.com/office/powerpoint/2010/main" val="3677194970"/>
       </p:ext>
     </p:extLst>
   </p:cSld>
@@ -1768,7 +1768,7 @@
     </p:spTree>
     <p:extLst>
       <p:ext uri="{BB962C8B-B14F-4D97-AF65-F5344CB8AC3E}">
-        <p14:creationId xmlns:p14="http://schemas.microsoft.com/office/powerpoint/2010/main" xmlns="" val="2089713745"/>
+        <p14:creationId xmlns:p14="http://schemas.microsoft.com/office/powerpoint/2010/main" val="2089713745"/>
       </p:ext>
     </p:extLst>
   </p:cSld>
@@ -1857,7 +1857,7 @@
     </p:spTree>
     <p:extLst>
       <p:ext uri="{BB962C8B-B14F-4D97-AF65-F5344CB8AC3E}">
-        <p14:creationId xmlns:p14="http://schemas.microsoft.com/office/powerpoint/2010/main" xmlns="" val="1186926255"/>
+        <p14:creationId xmlns:p14="http://schemas.microsoft.com/office/powerpoint/2010/main" val="1186926255"/>
       </p:ext>
     </p:extLst>
   </p:cSld>
@@ -1942,7 +1942,7 @@
     </p:spTree>
     <p:extLst>
       <p:ext uri="{BB962C8B-B14F-4D97-AF65-F5344CB8AC3E}">
-        <p14:creationId xmlns:p14="http://schemas.microsoft.com/office/powerpoint/2010/main" xmlns="" val="2835018539"/>
+        <p14:creationId xmlns:p14="http://schemas.microsoft.com/office/powerpoint/2010/main" val="2835018539"/>
       </p:ext>
     </p:extLst>
   </p:cSld>
@@ -2127,7 +2127,7 @@
             <a:fld id="{80E5386A-0EC8-4140-9404-D7701A815490}" type="slidenum">
               <a:rPr lang="de-DE" smtClean="0"/>
               <a:pPr/>
-              <a:t>‹#›</a:t>
+              <a:t>‹Nr.›</a:t>
             </a:fld>
             <a:endParaRPr lang="de-DE"/>
           </a:p>
@@ -2136,7 +2136,7 @@
     </p:spTree>
     <p:extLst>
       <p:ext uri="{BB962C8B-B14F-4D97-AF65-F5344CB8AC3E}">
-        <p14:creationId xmlns:p14="http://schemas.microsoft.com/office/powerpoint/2010/main" xmlns="" val="500692096"/>
+        <p14:creationId xmlns:p14="http://schemas.microsoft.com/office/powerpoint/2010/main" val="500692096"/>
       </p:ext>
     </p:extLst>
   </p:cSld>
@@ -2299,7 +2299,7 @@
             <a:fld id="{80E5386A-0EC8-4140-9404-D7701A815490}" type="slidenum">
               <a:rPr lang="de-DE" smtClean="0"/>
               <a:pPr/>
-              <a:t>‹#›</a:t>
+              <a:t>‹Nr.›</a:t>
             </a:fld>
             <a:endParaRPr lang="de-DE"/>
           </a:p>
@@ -2308,7 +2308,7 @@
     </p:spTree>
     <p:extLst>
       <p:ext uri="{BB962C8B-B14F-4D97-AF65-F5344CB8AC3E}">
-        <p14:creationId xmlns:p14="http://schemas.microsoft.com/office/powerpoint/2010/main" xmlns="" val="164540569"/>
+        <p14:creationId xmlns:p14="http://schemas.microsoft.com/office/powerpoint/2010/main" val="164540569"/>
       </p:ext>
     </p:extLst>
   </p:cSld>
@@ -2481,7 +2481,7 @@
             <a:fld id="{80E5386A-0EC8-4140-9404-D7701A815490}" type="slidenum">
               <a:rPr lang="de-DE" smtClean="0"/>
               <a:pPr/>
-              <a:t>‹#›</a:t>
+              <a:t>‹Nr.›</a:t>
             </a:fld>
             <a:endParaRPr lang="de-DE"/>
           </a:p>
@@ -2490,7 +2490,7 @@
     </p:spTree>
     <p:extLst>
       <p:ext uri="{BB962C8B-B14F-4D97-AF65-F5344CB8AC3E}">
-        <p14:creationId xmlns:p14="http://schemas.microsoft.com/office/powerpoint/2010/main" xmlns="" val="1006822788"/>
+        <p14:creationId xmlns:p14="http://schemas.microsoft.com/office/powerpoint/2010/main" val="1006822788"/>
       </p:ext>
     </p:extLst>
   </p:cSld>
@@ -2653,7 +2653,7 @@
             <a:fld id="{80E5386A-0EC8-4140-9404-D7701A815490}" type="slidenum">
               <a:rPr lang="de-DE" smtClean="0"/>
               <a:pPr/>
-              <a:t>‹#›</a:t>
+              <a:t>‹Nr.›</a:t>
             </a:fld>
             <a:endParaRPr lang="de-DE"/>
           </a:p>
@@ -2662,7 +2662,7 @@
     </p:spTree>
     <p:extLst>
       <p:ext uri="{BB962C8B-B14F-4D97-AF65-F5344CB8AC3E}">
-        <p14:creationId xmlns:p14="http://schemas.microsoft.com/office/powerpoint/2010/main" xmlns="" val="1414333685"/>
+        <p14:creationId xmlns:p14="http://schemas.microsoft.com/office/powerpoint/2010/main" val="1414333685"/>
       </p:ext>
     </p:extLst>
   </p:cSld>
@@ -2899,7 +2899,7 @@
             <a:fld id="{80E5386A-0EC8-4140-9404-D7701A815490}" type="slidenum">
               <a:rPr lang="de-DE" smtClean="0"/>
               <a:pPr/>
-              <a:t>‹#›</a:t>
+              <a:t>‹Nr.›</a:t>
             </a:fld>
             <a:endParaRPr lang="de-DE"/>
           </a:p>
@@ -2908,7 +2908,7 @@
     </p:spTree>
     <p:extLst>
       <p:ext uri="{BB962C8B-B14F-4D97-AF65-F5344CB8AC3E}">
-        <p14:creationId xmlns:p14="http://schemas.microsoft.com/office/powerpoint/2010/main" xmlns="" val="795254627"/>
+        <p14:creationId xmlns:p14="http://schemas.microsoft.com/office/powerpoint/2010/main" val="795254627"/>
       </p:ext>
     </p:extLst>
   </p:cSld>
@@ -3133,7 +3133,7 @@
             <a:fld id="{80E5386A-0EC8-4140-9404-D7701A815490}" type="slidenum">
               <a:rPr lang="de-DE" smtClean="0"/>
               <a:pPr/>
-              <a:t>‹#›</a:t>
+              <a:t>‹Nr.›</a:t>
             </a:fld>
             <a:endParaRPr lang="de-DE"/>
           </a:p>
@@ -3142,7 +3142,7 @@
     </p:spTree>
     <p:extLst>
       <p:ext uri="{BB962C8B-B14F-4D97-AF65-F5344CB8AC3E}">
-        <p14:creationId xmlns:p14="http://schemas.microsoft.com/office/powerpoint/2010/main" xmlns="" val="1772190497"/>
+        <p14:creationId xmlns:p14="http://schemas.microsoft.com/office/powerpoint/2010/main" val="1772190497"/>
       </p:ext>
     </p:extLst>
   </p:cSld>
@@ -3502,7 +3502,7 @@
             <a:fld id="{80E5386A-0EC8-4140-9404-D7701A815490}" type="slidenum">
               <a:rPr lang="de-DE" smtClean="0"/>
               <a:pPr/>
-              <a:t>‹#›</a:t>
+              <a:t>‹Nr.›</a:t>
             </a:fld>
             <a:endParaRPr lang="de-DE"/>
           </a:p>
@@ -3511,7 +3511,7 @@
     </p:spTree>
     <p:extLst>
       <p:ext uri="{BB962C8B-B14F-4D97-AF65-F5344CB8AC3E}">
-        <p14:creationId xmlns:p14="http://schemas.microsoft.com/office/powerpoint/2010/main" xmlns="" val="4291559157"/>
+        <p14:creationId xmlns:p14="http://schemas.microsoft.com/office/powerpoint/2010/main" val="4291559157"/>
       </p:ext>
     </p:extLst>
   </p:cSld>
@@ -3622,7 +3622,7 @@
             <a:fld id="{80E5386A-0EC8-4140-9404-D7701A815490}" type="slidenum">
               <a:rPr lang="de-DE" smtClean="0"/>
               <a:pPr/>
-              <a:t>‹#›</a:t>
+              <a:t>‹Nr.›</a:t>
             </a:fld>
             <a:endParaRPr lang="de-DE"/>
           </a:p>
@@ -3631,7 +3631,7 @@
     </p:spTree>
     <p:extLst>
       <p:ext uri="{BB962C8B-B14F-4D97-AF65-F5344CB8AC3E}">
-        <p14:creationId xmlns:p14="http://schemas.microsoft.com/office/powerpoint/2010/main" xmlns="" val="3831224926"/>
+        <p14:creationId xmlns:p14="http://schemas.microsoft.com/office/powerpoint/2010/main" val="3831224926"/>
       </p:ext>
     </p:extLst>
   </p:cSld>
@@ -3719,7 +3719,7 @@
             <a:fld id="{80E5386A-0EC8-4140-9404-D7701A815490}" type="slidenum">
               <a:rPr lang="de-DE" smtClean="0"/>
               <a:pPr/>
-              <a:t>‹#›</a:t>
+              <a:t>‹Nr.›</a:t>
             </a:fld>
             <a:endParaRPr lang="de-DE"/>
           </a:p>
@@ -3728,7 +3728,7 @@
     </p:spTree>
     <p:extLst>
       <p:ext uri="{BB962C8B-B14F-4D97-AF65-F5344CB8AC3E}">
-        <p14:creationId xmlns:p14="http://schemas.microsoft.com/office/powerpoint/2010/main" xmlns="" val="3053550287"/>
+        <p14:creationId xmlns:p14="http://schemas.microsoft.com/office/powerpoint/2010/main" val="3053550287"/>
       </p:ext>
     </p:extLst>
   </p:cSld>
@@ -3998,7 +3998,7 @@
             <a:fld id="{80E5386A-0EC8-4140-9404-D7701A815490}" type="slidenum">
               <a:rPr lang="de-DE" smtClean="0"/>
               <a:pPr/>
-              <a:t>‹#›</a:t>
+              <a:t>‹Nr.›</a:t>
             </a:fld>
             <a:endParaRPr lang="de-DE"/>
           </a:p>
@@ -4007,7 +4007,7 @@
     </p:spTree>
     <p:extLst>
       <p:ext uri="{BB962C8B-B14F-4D97-AF65-F5344CB8AC3E}">
-        <p14:creationId xmlns:p14="http://schemas.microsoft.com/office/powerpoint/2010/main" xmlns="" val="1820871871"/>
+        <p14:creationId xmlns:p14="http://schemas.microsoft.com/office/powerpoint/2010/main" val="1820871871"/>
       </p:ext>
     </p:extLst>
   </p:cSld>
@@ -4257,7 +4257,7 @@
             <a:fld id="{80E5386A-0EC8-4140-9404-D7701A815490}" type="slidenum">
               <a:rPr lang="de-DE" smtClean="0"/>
               <a:pPr/>
-              <a:t>‹#›</a:t>
+              <a:t>‹Nr.›</a:t>
             </a:fld>
             <a:endParaRPr lang="de-DE"/>
           </a:p>
@@ -4266,7 +4266,7 @@
     </p:spTree>
     <p:extLst>
       <p:ext uri="{BB962C8B-B14F-4D97-AF65-F5344CB8AC3E}">
-        <p14:creationId xmlns:p14="http://schemas.microsoft.com/office/powerpoint/2010/main" xmlns="" val="1857588901"/>
+        <p14:creationId xmlns:p14="http://schemas.microsoft.com/office/powerpoint/2010/main" val="1857588901"/>
       </p:ext>
     </p:extLst>
   </p:cSld>
@@ -4508,7 +4508,7 @@
             <a:fld id="{80E5386A-0EC8-4140-9404-D7701A815490}" type="slidenum">
               <a:rPr lang="de-DE" smtClean="0"/>
               <a:pPr/>
-              <a:t>‹#›</a:t>
+              <a:t>‹Nr.›</a:t>
             </a:fld>
             <a:endParaRPr lang="de-DE"/>
           </a:p>
@@ -4517,7 +4517,7 @@
     </p:spTree>
     <p:extLst>
       <p:ext uri="{BB962C8B-B14F-4D97-AF65-F5344CB8AC3E}">
-        <p14:creationId xmlns:p14="http://schemas.microsoft.com/office/powerpoint/2010/main" xmlns="" val="2164411788"/>
+        <p14:creationId xmlns:p14="http://schemas.microsoft.com/office/powerpoint/2010/main" val="2164411788"/>
       </p:ext>
     </p:extLst>
   </p:cSld>
@@ -5117,7 +5117,7 @@
     </p:spTree>
     <p:extLst>
       <p:ext uri="{BB962C8B-B14F-4D97-AF65-F5344CB8AC3E}">
-        <p14:creationId xmlns:p14="http://schemas.microsoft.com/office/powerpoint/2010/main" xmlns="" val="2457868809"/>
+        <p14:creationId xmlns:p14="http://schemas.microsoft.com/office/powerpoint/2010/main" val="2457868809"/>
       </p:ext>
     </p:extLst>
   </p:cSld>
@@ -5362,7 +5362,7 @@
     </p:spTree>
     <p:extLst>
       <p:ext uri="{BB962C8B-B14F-4D97-AF65-F5344CB8AC3E}">
-        <p14:creationId xmlns:p14="http://schemas.microsoft.com/office/powerpoint/2010/main" xmlns="" val="4073026753"/>
+        <p14:creationId xmlns:p14="http://schemas.microsoft.com/office/powerpoint/2010/main" val="4073026753"/>
       </p:ext>
     </p:extLst>
   </p:cSld>
@@ -5544,32 +5544,6 @@
       </p:sp>
       <p:sp>
         <p:nvSpPr>
-          <p:cNvPr id="7" name="Textfeld 6"/>
-          <p:cNvSpPr txBox="1"/>
-          <p:nvPr/>
-        </p:nvSpPr>
-        <p:spPr>
-          <a:xfrm>
-            <a:off x="902213" y="2685178"/>
-            <a:ext cx="7339573" cy="523220"/>
-          </a:xfrm>
-          <a:prstGeom prst="rect">
-            <a:avLst/>
-          </a:prstGeom>
-          <a:noFill/>
-        </p:spPr>
-        <p:txBody>
-          <a:bodyPr wrap="square" rtlCol="0">
-            <a:spAutoFit/>
-          </a:bodyPr>
-          <a:lstStyle/>
-          <a:p>
-            <a:endParaRPr lang="de-DE" sz="2800" dirty="0" smtClean="0"/>
-          </a:p>
-        </p:txBody>
-      </p:sp>
-      <p:sp>
-        <p:nvSpPr>
           <p:cNvPr id="9" name="Textfeld 8"/>
           <p:cNvSpPr txBox="1"/>
           <p:nvPr/>
@@ -5602,36 +5576,476 @@
           </a:p>
         </p:txBody>
       </p:sp>
-      <p:pic>
-        <p:nvPicPr>
-          <p:cNvPr id="1026" name="Picture 2" descr="C:\Users\xtremer\Desktop\imgo.jpg"/>
-          <p:cNvPicPr>
-            <a:picLocks noChangeAspect="1" noChangeArrowheads="1"/>
-          </p:cNvPicPr>
-          <p:nvPr/>
-        </p:nvPicPr>
-        <p:blipFill>
-          <a:blip r:embed="rId3"/>
-          <a:srcRect/>
-          <a:stretch>
-            <a:fillRect/>
-          </a:stretch>
-        </p:blipFill>
-        <p:spPr bwMode="auto">
-          <a:xfrm>
-            <a:off x="2167466" y="1876172"/>
-            <a:ext cx="4334934" cy="4727827"/>
-          </a:xfrm>
-          <a:prstGeom prst="rect">
-            <a:avLst/>
-          </a:prstGeom>
-          <a:noFill/>
-        </p:spPr>
-      </p:pic>
+      <p:sp>
+        <p:nvSpPr>
+          <p:cNvPr id="8" name="Abgerundetes Rechteck 7"/>
+          <p:cNvSpPr/>
+          <p:nvPr/>
+        </p:nvSpPr>
+        <p:spPr>
+          <a:xfrm>
+            <a:off x="3195501" y="3134430"/>
+            <a:ext cx="2578167" cy="788410"/>
+          </a:xfrm>
+          <a:prstGeom prst="roundRect">
+            <a:avLst/>
+          </a:prstGeom>
+        </p:spPr>
+        <p:style>
+          <a:lnRef idx="2">
+            <a:schemeClr val="accent1">
+              <a:shade val="50000"/>
+            </a:schemeClr>
+          </a:lnRef>
+          <a:fillRef idx="1">
+            <a:schemeClr val="accent1"/>
+          </a:fillRef>
+          <a:effectRef idx="0">
+            <a:schemeClr val="accent1"/>
+          </a:effectRef>
+          <a:fontRef idx="minor">
+            <a:schemeClr val="lt1"/>
+          </a:fontRef>
+        </p:style>
+        <p:txBody>
+          <a:bodyPr rtlCol="0" anchor="ctr"/>
+          <a:lstStyle/>
+          <a:p>
+            <a:pPr algn="ctr"/>
+            <a:r>
+              <a:rPr lang="de-DE" sz="2000" b="1" dirty="0" smtClean="0"/>
+              <a:t>Backend</a:t>
+            </a:r>
+          </a:p>
+          <a:p>
+            <a:pPr algn="ctr"/>
+            <a:r>
+              <a:rPr lang="de-DE" sz="2000" i="1" dirty="0" smtClean="0"/>
+              <a:t>JS, </a:t>
+            </a:r>
+            <a:r>
+              <a:rPr lang="de-DE" sz="2000" i="1" dirty="0" err="1" smtClean="0"/>
+              <a:t>jQuery</a:t>
+            </a:r>
+            <a:r>
+              <a:rPr lang="de-DE" sz="2000" i="1" dirty="0" smtClean="0"/>
+              <a:t>, Ruby</a:t>
+            </a:r>
+            <a:endParaRPr lang="de-DE" i="1" dirty="0"/>
+          </a:p>
+        </p:txBody>
+      </p:sp>
+      <p:sp>
+        <p:nvSpPr>
+          <p:cNvPr id="11" name="Abgerundetes Rechteck 10"/>
+          <p:cNvSpPr/>
+          <p:nvPr/>
+        </p:nvSpPr>
+        <p:spPr>
+          <a:xfrm>
+            <a:off x="834709" y="2001110"/>
+            <a:ext cx="2196352" cy="829110"/>
+          </a:xfrm>
+          <a:prstGeom prst="roundRect">
+            <a:avLst/>
+          </a:prstGeom>
+        </p:spPr>
+        <p:style>
+          <a:lnRef idx="2">
+            <a:schemeClr val="accent2">
+              <a:shade val="50000"/>
+            </a:schemeClr>
+          </a:lnRef>
+          <a:fillRef idx="1">
+            <a:schemeClr val="accent2"/>
+          </a:fillRef>
+          <a:effectRef idx="0">
+            <a:schemeClr val="accent2"/>
+          </a:effectRef>
+          <a:fontRef idx="minor">
+            <a:schemeClr val="lt1"/>
+          </a:fontRef>
+        </p:style>
+        <p:txBody>
+          <a:bodyPr rtlCol="0" anchor="ctr"/>
+          <a:lstStyle/>
+          <a:p>
+            <a:pPr algn="ctr"/>
+            <a:r>
+              <a:rPr lang="de-DE" sz="2000" b="1" dirty="0" smtClean="0"/>
+              <a:t>Web Server</a:t>
+            </a:r>
+          </a:p>
+          <a:p>
+            <a:pPr algn="ctr"/>
+            <a:r>
+              <a:rPr lang="de-DE" sz="2000" i="1" dirty="0" smtClean="0"/>
+              <a:t>Apache, Debian</a:t>
+            </a:r>
+            <a:endParaRPr lang="de-DE" i="1" dirty="0"/>
+          </a:p>
+        </p:txBody>
+      </p:sp>
+      <p:sp>
+        <p:nvSpPr>
+          <p:cNvPr id="12" name="Abgerundetes Rechteck 11"/>
+          <p:cNvSpPr/>
+          <p:nvPr/>
+        </p:nvSpPr>
+        <p:spPr>
+          <a:xfrm>
+            <a:off x="5938108" y="2001110"/>
+            <a:ext cx="2196352" cy="829110"/>
+          </a:xfrm>
+          <a:prstGeom prst="roundRect">
+            <a:avLst/>
+          </a:prstGeom>
+        </p:spPr>
+        <p:style>
+          <a:lnRef idx="2">
+            <a:schemeClr val="accent2">
+              <a:shade val="50000"/>
+            </a:schemeClr>
+          </a:lnRef>
+          <a:fillRef idx="1">
+            <a:schemeClr val="accent2"/>
+          </a:fillRef>
+          <a:effectRef idx="0">
+            <a:schemeClr val="accent2"/>
+          </a:effectRef>
+          <a:fontRef idx="minor">
+            <a:schemeClr val="lt1"/>
+          </a:fontRef>
+        </p:style>
+        <p:txBody>
+          <a:bodyPr rtlCol="0" anchor="ctr"/>
+          <a:lstStyle/>
+          <a:p>
+            <a:pPr algn="ctr"/>
+            <a:r>
+              <a:rPr lang="de-DE" sz="2000" b="1" dirty="0" smtClean="0"/>
+              <a:t>Datenbank</a:t>
+            </a:r>
+          </a:p>
+          <a:p>
+            <a:pPr algn="ctr"/>
+            <a:r>
+              <a:rPr lang="de-DE" sz="2000" i="1" dirty="0" err="1" smtClean="0"/>
+              <a:t>mySQL</a:t>
+            </a:r>
+            <a:endParaRPr lang="de-DE" i="1" dirty="0"/>
+          </a:p>
+        </p:txBody>
+      </p:sp>
+      <p:sp>
+        <p:nvSpPr>
+          <p:cNvPr id="13" name="Abgerundetes Rechteck 12"/>
+          <p:cNvSpPr/>
+          <p:nvPr/>
+        </p:nvSpPr>
+        <p:spPr>
+          <a:xfrm>
+            <a:off x="3195500" y="3922840"/>
+            <a:ext cx="2578167" cy="788410"/>
+          </a:xfrm>
+          <a:prstGeom prst="roundRect">
+            <a:avLst/>
+          </a:prstGeom>
+        </p:spPr>
+        <p:style>
+          <a:lnRef idx="2">
+            <a:schemeClr val="accent1">
+              <a:shade val="50000"/>
+            </a:schemeClr>
+          </a:lnRef>
+          <a:fillRef idx="1">
+            <a:schemeClr val="accent1"/>
+          </a:fillRef>
+          <a:effectRef idx="0">
+            <a:schemeClr val="accent1"/>
+          </a:effectRef>
+          <a:fontRef idx="minor">
+            <a:schemeClr val="lt1"/>
+          </a:fontRef>
+        </p:style>
+        <p:txBody>
+          <a:bodyPr rtlCol="0" anchor="ctr"/>
+          <a:lstStyle/>
+          <a:p>
+            <a:pPr algn="ctr"/>
+            <a:r>
+              <a:rPr lang="de-DE" sz="2000" b="1" dirty="0" smtClean="0"/>
+              <a:t>Frontend</a:t>
+            </a:r>
+          </a:p>
+          <a:p>
+            <a:pPr algn="ctr"/>
+            <a:r>
+              <a:rPr lang="de-DE" sz="2000" i="1" dirty="0" smtClean="0"/>
+              <a:t>HTML5, CSS, JS</a:t>
+            </a:r>
+            <a:endParaRPr lang="de-DE" i="1" dirty="0"/>
+          </a:p>
+        </p:txBody>
+      </p:sp>
+      <p:sp>
+        <p:nvSpPr>
+          <p:cNvPr id="14" name="Abgerundetes Rechteck 13"/>
+          <p:cNvSpPr/>
+          <p:nvPr/>
+        </p:nvSpPr>
+        <p:spPr>
+          <a:xfrm>
+            <a:off x="836251" y="5248550"/>
+            <a:ext cx="2196352" cy="829110"/>
+          </a:xfrm>
+          <a:prstGeom prst="roundRect">
+            <a:avLst/>
+          </a:prstGeom>
+        </p:spPr>
+        <p:style>
+          <a:lnRef idx="2">
+            <a:schemeClr val="accent2">
+              <a:shade val="50000"/>
+            </a:schemeClr>
+          </a:lnRef>
+          <a:fillRef idx="1">
+            <a:schemeClr val="accent2"/>
+          </a:fillRef>
+          <a:effectRef idx="0">
+            <a:schemeClr val="accent2"/>
+          </a:effectRef>
+          <a:fontRef idx="minor">
+            <a:schemeClr val="lt1"/>
+          </a:fontRef>
+        </p:style>
+        <p:txBody>
+          <a:bodyPr rtlCol="0" anchor="ctr"/>
+          <a:lstStyle/>
+          <a:p>
+            <a:pPr algn="ctr"/>
+            <a:r>
+              <a:rPr lang="de-DE" sz="2000" b="1" dirty="0" smtClean="0"/>
+              <a:t>UI</a:t>
+            </a:r>
+          </a:p>
+          <a:p>
+            <a:pPr algn="ctr"/>
+            <a:r>
+              <a:rPr lang="de-DE" sz="2000" i="1" dirty="0" smtClean="0"/>
+              <a:t>Bootstrap</a:t>
+            </a:r>
+            <a:endParaRPr lang="de-DE" i="1" dirty="0"/>
+          </a:p>
+        </p:txBody>
+      </p:sp>
+      <p:sp>
+        <p:nvSpPr>
+          <p:cNvPr id="15" name="Abgerundetes Rechteck 14"/>
+          <p:cNvSpPr/>
+          <p:nvPr/>
+        </p:nvSpPr>
+        <p:spPr>
+          <a:xfrm>
+            <a:off x="5938108" y="5248550"/>
+            <a:ext cx="2196352" cy="829110"/>
+          </a:xfrm>
+          <a:prstGeom prst="roundRect">
+            <a:avLst/>
+          </a:prstGeom>
+        </p:spPr>
+        <p:style>
+          <a:lnRef idx="2">
+            <a:schemeClr val="accent2">
+              <a:shade val="50000"/>
+            </a:schemeClr>
+          </a:lnRef>
+          <a:fillRef idx="1">
+            <a:schemeClr val="accent2"/>
+          </a:fillRef>
+          <a:effectRef idx="0">
+            <a:schemeClr val="accent2"/>
+          </a:effectRef>
+          <a:fontRef idx="minor">
+            <a:schemeClr val="lt1"/>
+          </a:fontRef>
+        </p:style>
+        <p:txBody>
+          <a:bodyPr rtlCol="0" anchor="ctr"/>
+          <a:lstStyle/>
+          <a:p>
+            <a:pPr algn="ctr"/>
+            <a:r>
+              <a:rPr lang="de-DE" sz="2000" b="1" dirty="0" smtClean="0"/>
+              <a:t>Datei-Upload</a:t>
+            </a:r>
+          </a:p>
+          <a:p>
+            <a:pPr algn="ctr"/>
+            <a:r>
+              <a:rPr lang="de-DE" sz="2000" i="1" dirty="0" smtClean="0"/>
+              <a:t>HTTP</a:t>
+            </a:r>
+            <a:endParaRPr lang="de-DE" i="1" dirty="0"/>
+          </a:p>
+        </p:txBody>
+      </p:sp>
+      <p:cxnSp>
+        <p:nvCxnSpPr>
+          <p:cNvPr id="16" name="Gerader Verbinder 15"/>
+          <p:cNvCxnSpPr>
+            <a:stCxn id="11" idx="2"/>
+            <a:endCxn id="8" idx="1"/>
+          </p:cNvCxnSpPr>
+          <p:nvPr/>
+        </p:nvCxnSpPr>
+        <p:spPr>
+          <a:xfrm>
+            <a:off x="1932885" y="2830220"/>
+            <a:ext cx="1262616" cy="698415"/>
+          </a:xfrm>
+          <a:prstGeom prst="line">
+            <a:avLst/>
+          </a:prstGeom>
+          <a:ln>
+            <a:solidFill>
+              <a:schemeClr val="tx1"/>
+            </a:solidFill>
+          </a:ln>
+        </p:spPr>
+        <p:style>
+          <a:lnRef idx="1">
+            <a:schemeClr val="accent1"/>
+          </a:lnRef>
+          <a:fillRef idx="0">
+            <a:schemeClr val="accent1"/>
+          </a:fillRef>
+          <a:effectRef idx="0">
+            <a:schemeClr val="accent1"/>
+          </a:effectRef>
+          <a:fontRef idx="minor">
+            <a:schemeClr val="tx1"/>
+          </a:fontRef>
+        </p:style>
+      </p:cxnSp>
+      <p:cxnSp>
+        <p:nvCxnSpPr>
+          <p:cNvPr id="18" name="Gerader Verbinder 17"/>
+          <p:cNvCxnSpPr>
+            <a:stCxn id="12" idx="2"/>
+            <a:endCxn id="8" idx="3"/>
+          </p:cNvCxnSpPr>
+          <p:nvPr/>
+        </p:nvCxnSpPr>
+        <p:spPr>
+          <a:xfrm flipH="1">
+            <a:off x="5773668" y="2830220"/>
+            <a:ext cx="1262616" cy="698415"/>
+          </a:xfrm>
+          <a:prstGeom prst="line">
+            <a:avLst/>
+          </a:prstGeom>
+          <a:ln>
+            <a:solidFill>
+              <a:schemeClr val="tx1"/>
+            </a:solidFill>
+          </a:ln>
+        </p:spPr>
+        <p:style>
+          <a:lnRef idx="1">
+            <a:schemeClr val="accent1"/>
+          </a:lnRef>
+          <a:fillRef idx="0">
+            <a:schemeClr val="accent1"/>
+          </a:fillRef>
+          <a:effectRef idx="0">
+            <a:schemeClr val="accent1"/>
+          </a:effectRef>
+          <a:fontRef idx="minor">
+            <a:schemeClr val="tx1"/>
+          </a:fontRef>
+        </p:style>
+      </p:cxnSp>
+      <p:cxnSp>
+        <p:nvCxnSpPr>
+          <p:cNvPr id="20" name="Gerader Verbinder 19"/>
+          <p:cNvCxnSpPr>
+            <a:stCxn id="14" idx="0"/>
+            <a:endCxn id="13" idx="1"/>
+          </p:cNvCxnSpPr>
+          <p:nvPr/>
+        </p:nvCxnSpPr>
+        <p:spPr>
+          <a:xfrm flipV="1">
+            <a:off x="1934427" y="4317045"/>
+            <a:ext cx="1261073" cy="931505"/>
+          </a:xfrm>
+          <a:prstGeom prst="line">
+            <a:avLst/>
+          </a:prstGeom>
+          <a:ln>
+            <a:solidFill>
+              <a:schemeClr val="tx1"/>
+            </a:solidFill>
+          </a:ln>
+        </p:spPr>
+        <p:style>
+          <a:lnRef idx="1">
+            <a:schemeClr val="accent1"/>
+          </a:lnRef>
+          <a:fillRef idx="0">
+            <a:schemeClr val="accent1"/>
+          </a:fillRef>
+          <a:effectRef idx="0">
+            <a:schemeClr val="accent1"/>
+          </a:effectRef>
+          <a:fontRef idx="minor">
+            <a:schemeClr val="tx1"/>
+          </a:fontRef>
+        </p:style>
+      </p:cxnSp>
+      <p:cxnSp>
+        <p:nvCxnSpPr>
+          <p:cNvPr id="22" name="Gerader Verbinder 21"/>
+          <p:cNvCxnSpPr>
+            <a:stCxn id="15" idx="0"/>
+            <a:endCxn id="13" idx="3"/>
+          </p:cNvCxnSpPr>
+          <p:nvPr/>
+        </p:nvCxnSpPr>
+        <p:spPr>
+          <a:xfrm flipH="1" flipV="1">
+            <a:off x="5773667" y="4317045"/>
+            <a:ext cx="1262617" cy="931505"/>
+          </a:xfrm>
+          <a:prstGeom prst="line">
+            <a:avLst/>
+          </a:prstGeom>
+          <a:ln>
+            <a:solidFill>
+              <a:schemeClr val="tx1"/>
+            </a:solidFill>
+          </a:ln>
+        </p:spPr>
+        <p:style>
+          <a:lnRef idx="1">
+            <a:schemeClr val="accent1"/>
+          </a:lnRef>
+          <a:fillRef idx="0">
+            <a:schemeClr val="accent1"/>
+          </a:fillRef>
+          <a:effectRef idx="0">
+            <a:schemeClr val="accent1"/>
+          </a:effectRef>
+          <a:fontRef idx="minor">
+            <a:schemeClr val="tx1"/>
+          </a:fontRef>
+        </p:style>
+      </p:cxnSp>
     </p:spTree>
     <p:extLst>
       <p:ext uri="{BB962C8B-B14F-4D97-AF65-F5344CB8AC3E}">
-        <p14:creationId xmlns:p14="http://schemas.microsoft.com/office/powerpoint/2010/main" xmlns="" val="2413207947"/>
+        <p14:creationId xmlns:p14="http://schemas.microsoft.com/office/powerpoint/2010/main" val="2487262625"/>
       </p:ext>
     </p:extLst>
   </p:cSld>
@@ -5871,7 +6285,7 @@
     </p:spTree>
     <p:extLst>
       <p:ext uri="{BB962C8B-B14F-4D97-AF65-F5344CB8AC3E}">
-        <p14:creationId xmlns:p14="http://schemas.microsoft.com/office/powerpoint/2010/main" xmlns="" val="3599283958"/>
+        <p14:creationId xmlns:p14="http://schemas.microsoft.com/office/powerpoint/2010/main" val="3599283958"/>
       </p:ext>
     </p:extLst>
   </p:cSld>
@@ -6067,7 +6481,7 @@
           <a:blip r:embed="rId3">
             <a:extLst>
               <a:ext uri="{28A0092B-C50C-407E-A947-70E740481C1C}">
-                <a14:useLocalDpi xmlns:a14="http://schemas.microsoft.com/office/drawing/2010/main" xmlns="" val="0"/>
+                <a14:useLocalDpi xmlns:a14="http://schemas.microsoft.com/office/drawing/2010/main" val="0"/>
               </a:ext>
             </a:extLst>
           </a:blip>
@@ -6122,7 +6536,7 @@
     </p:spTree>
     <p:extLst>
       <p:ext uri="{BB962C8B-B14F-4D97-AF65-F5344CB8AC3E}">
-        <p14:creationId xmlns:p14="http://schemas.microsoft.com/office/powerpoint/2010/main" xmlns="" val="1114001791"/>
+        <p14:creationId xmlns:p14="http://schemas.microsoft.com/office/powerpoint/2010/main" val="1114001791"/>
       </p:ext>
     </p:extLst>
   </p:cSld>
@@ -6350,13 +6764,8 @@
             </a:pPr>
             <a:r>
               <a:rPr lang="de-DE" sz="2800" dirty="0" smtClean="0"/>
-              <a:t>SSL </a:t>
-            </a:r>
-            <a:r>
-              <a:rPr lang="de-DE" sz="2800" dirty="0" smtClean="0"/>
-              <a:t>Verschlüsselung</a:t>
-            </a:r>
-            <a:endParaRPr lang="de-DE" sz="2800" dirty="0" smtClean="0"/>
+              <a:t>SSL Verschlüsselung</a:t>
+            </a:r>
           </a:p>
           <a:p>
             <a:pPr marL="457200" indent="-457200">
@@ -6404,7 +6813,7 @@
     </p:spTree>
     <p:extLst>
       <p:ext uri="{BB962C8B-B14F-4D97-AF65-F5344CB8AC3E}">
-        <p14:creationId xmlns:p14="http://schemas.microsoft.com/office/powerpoint/2010/main" xmlns="" val="2093766798"/>
+        <p14:creationId xmlns:p14="http://schemas.microsoft.com/office/powerpoint/2010/main" val="2093766798"/>
       </p:ext>
     </p:extLst>
   </p:cSld>
@@ -6734,7 +7143,7 @@
     </p:spTree>
     <p:extLst>
       <p:ext uri="{BB962C8B-B14F-4D97-AF65-F5344CB8AC3E}">
-        <p14:creationId xmlns:p14="http://schemas.microsoft.com/office/powerpoint/2010/main" xmlns="" val="2133853676"/>
+        <p14:creationId xmlns:p14="http://schemas.microsoft.com/office/powerpoint/2010/main" val="2133853676"/>
       </p:ext>
     </p:extLst>
   </p:cSld>
@@ -6980,7 +7389,7 @@
     </p:spTree>
     <p:extLst>
       <p:ext uri="{BB962C8B-B14F-4D97-AF65-F5344CB8AC3E}">
-        <p14:creationId xmlns:p14="http://schemas.microsoft.com/office/powerpoint/2010/main" xmlns="" val="3043546882"/>
+        <p14:creationId xmlns:p14="http://schemas.microsoft.com/office/powerpoint/2010/main" val="3043546882"/>
       </p:ext>
     </p:extLst>
   </p:cSld>
@@ -7277,7 +7686,7 @@
     </p:spTree>
     <p:extLst>
       <p:ext uri="{BB962C8B-B14F-4D97-AF65-F5344CB8AC3E}">
-        <p14:creationId xmlns:p14="http://schemas.microsoft.com/office/powerpoint/2010/main" xmlns="" val="603259009"/>
+        <p14:creationId xmlns:p14="http://schemas.microsoft.com/office/powerpoint/2010/main" val="603259009"/>
       </p:ext>
     </p:extLst>
   </p:cSld>
@@ -8055,7 +8464,7 @@
         </p:nvSpPr>
         <p:spPr>
           <a:xfrm>
-            <a:off x="258983" y="2897993"/>
+            <a:off x="283959" y="2897648"/>
             <a:ext cx="2575058" cy="336169"/>
           </a:xfrm>
           <a:prstGeom prst="rect">
@@ -8103,8 +8512,8 @@
         </p:nvSpPr>
         <p:spPr>
           <a:xfrm>
-            <a:off x="2845603" y="2894922"/>
-            <a:ext cx="6039411" cy="336169"/>
+            <a:off x="2859017" y="2894922"/>
+            <a:ext cx="5980183" cy="336169"/>
           </a:xfrm>
           <a:prstGeom prst="rect">
             <a:avLst/>
@@ -8204,7 +8613,7 @@
     </p:spTree>
     <p:extLst>
       <p:ext uri="{BB962C8B-B14F-4D97-AF65-F5344CB8AC3E}">
-        <p14:creationId xmlns:p14="http://schemas.microsoft.com/office/powerpoint/2010/main" xmlns="" val="2482602366"/>
+        <p14:creationId xmlns:p14="http://schemas.microsoft.com/office/powerpoint/2010/main" val="2482602366"/>
       </p:ext>
     </p:extLst>
   </p:cSld>
@@ -8407,7 +8816,6 @@
               <a:rPr lang="de-DE" sz="3200" dirty="0" smtClean="0"/>
               <a:t>Geschehenes/Geplantes</a:t>
             </a:r>
-            <a:endParaRPr lang="de-DE" sz="3200" dirty="0" smtClean="0"/>
           </a:p>
         </p:txBody>
       </p:sp>
@@ -8438,7 +8846,7 @@
     </p:spTree>
     <p:extLst>
       <p:ext uri="{BB962C8B-B14F-4D97-AF65-F5344CB8AC3E}">
-        <p14:creationId xmlns:p14="http://schemas.microsoft.com/office/powerpoint/2010/main" xmlns="" val="602259140"/>
+        <p14:creationId xmlns:p14="http://schemas.microsoft.com/office/powerpoint/2010/main" val="602259140"/>
       </p:ext>
     </p:extLst>
   </p:cSld>
@@ -8733,7 +9141,7 @@
           <a:blip r:embed="rId3">
             <a:extLst>
               <a:ext uri="{28A0092B-C50C-407E-A947-70E740481C1C}">
-                <a14:useLocalDpi xmlns:a14="http://schemas.microsoft.com/office/drawing/2010/main" xmlns="" val="0"/>
+                <a14:useLocalDpi xmlns:a14="http://schemas.microsoft.com/office/drawing/2010/main" val="0"/>
               </a:ext>
             </a:extLst>
           </a:blip>
@@ -8762,7 +9170,7 @@
           </a:effectLst>
           <a:extLst>
             <a:ext uri="{909E8E84-426E-40DD-AFC4-6F175D3DCCD1}">
-              <a14:hiddenFill xmlns:a14="http://schemas.microsoft.com/office/drawing/2010/main" xmlns="">
+              <a14:hiddenFill xmlns:a14="http://schemas.microsoft.com/office/drawing/2010/main">
                 <a:solidFill>
                   <a:srgbClr val="FFFFFF"/>
                 </a:solidFill>
@@ -8804,7 +9212,7 @@
     </p:spTree>
     <p:extLst>
       <p:ext uri="{BB962C8B-B14F-4D97-AF65-F5344CB8AC3E}">
-        <p14:creationId xmlns:p14="http://schemas.microsoft.com/office/powerpoint/2010/main" xmlns="" val="2964878449"/>
+        <p14:creationId xmlns:p14="http://schemas.microsoft.com/office/powerpoint/2010/main" val="2964878449"/>
       </p:ext>
     </p:extLst>
   </p:cSld>
@@ -9070,7 +9478,7 @@
     </p:spTree>
     <p:extLst>
       <p:ext uri="{BB962C8B-B14F-4D97-AF65-F5344CB8AC3E}">
-        <p14:creationId xmlns:p14="http://schemas.microsoft.com/office/powerpoint/2010/main" xmlns="" val="2730471926"/>
+        <p14:creationId xmlns:p14="http://schemas.microsoft.com/office/powerpoint/2010/main" val="2730471926"/>
       </p:ext>
     </p:extLst>
   </p:cSld>
@@ -9315,17 +9723,8 @@
             </a:pPr>
             <a:r>
               <a:rPr lang="de-DE" sz="2800" dirty="0" smtClean="0"/>
-              <a:t>immer</a:t>
-            </a:r>
-            <a:r>
-              <a:rPr lang="de-DE" sz="2800" dirty="0" smtClean="0"/>
-              <a:t> per E-Mail </a:t>
-            </a:r>
-            <a:r>
-              <a:rPr lang="de-DE" sz="2800" dirty="0" smtClean="0"/>
-              <a:t>erreichbar</a:t>
-            </a:r>
-            <a:endParaRPr lang="de-DE" sz="2800" dirty="0" smtClean="0"/>
+              <a:t>immer per E-Mail erreichbar</a:t>
+            </a:r>
           </a:p>
           <a:p>
             <a:pPr marL="457200" indent="-457200">
@@ -9383,7 +9782,7 @@
     </p:spTree>
     <p:extLst>
       <p:ext uri="{BB962C8B-B14F-4D97-AF65-F5344CB8AC3E}">
-        <p14:creationId xmlns:p14="http://schemas.microsoft.com/office/powerpoint/2010/main" xmlns="" val="203104389"/>
+        <p14:creationId xmlns:p14="http://schemas.microsoft.com/office/powerpoint/2010/main" val="203104389"/>
       </p:ext>
     </p:extLst>
   </p:cSld>
@@ -9672,7 +10071,7 @@
     </p:spTree>
     <p:extLst>
       <p:ext uri="{BB962C8B-B14F-4D97-AF65-F5344CB8AC3E}">
-        <p14:creationId xmlns:p14="http://schemas.microsoft.com/office/powerpoint/2010/main" xmlns="" val="1686385062"/>
+        <p14:creationId xmlns:p14="http://schemas.microsoft.com/office/powerpoint/2010/main" val="1686385062"/>
       </p:ext>
     </p:extLst>
   </p:cSld>
@@ -9978,7 +10377,7 @@
     </p:spTree>
     <p:extLst>
       <p:ext uri="{BB962C8B-B14F-4D97-AF65-F5344CB8AC3E}">
-        <p14:creationId xmlns:p14="http://schemas.microsoft.com/office/powerpoint/2010/main" xmlns="" val="3773158301"/>
+        <p14:creationId xmlns:p14="http://schemas.microsoft.com/office/powerpoint/2010/main" val="3773158301"/>
       </p:ext>
     </p:extLst>
   </p:cSld>
@@ -10259,7 +10658,7 @@
     </p:spTree>
     <p:extLst>
       <p:ext uri="{BB962C8B-B14F-4D97-AF65-F5344CB8AC3E}">
-        <p14:creationId xmlns:p14="http://schemas.microsoft.com/office/powerpoint/2010/main" xmlns="" val="1326091962"/>
+        <p14:creationId xmlns:p14="http://schemas.microsoft.com/office/powerpoint/2010/main" val="1326091962"/>
       </p:ext>
     </p:extLst>
   </p:cSld>
@@ -10500,7 +10899,7 @@
     </p:spTree>
     <p:extLst>
       <p:ext uri="{BB962C8B-B14F-4D97-AF65-F5344CB8AC3E}">
-        <p14:creationId xmlns:p14="http://schemas.microsoft.com/office/powerpoint/2010/main" xmlns="" val="2266342802"/>
+        <p14:creationId xmlns:p14="http://schemas.microsoft.com/office/powerpoint/2010/main" val="2266342802"/>
       </p:ext>
     </p:extLst>
   </p:cSld>
@@ -10772,7 +11171,7 @@
   <a:extraClrSchemeLst/>
   <a:extLst>
     <a:ext uri="{05A4C25C-085E-4340-85A3-A5531E510DB2}">
-      <thm15:themeFamily xmlns:thm15="http://schemas.microsoft.com/office/thememl/2012/main" xmlns="" name="Office Theme" id="{62F939B6-93AF-4DB8-9C6B-D6C7DFDC589F}" vid="{4A3C46E8-61CC-4603-A589-7422A47A8E4A}"/>
+      <thm15:themeFamily xmlns:thm15="http://schemas.microsoft.com/office/thememl/2012/main" name="Office Theme" id="{62F939B6-93AF-4DB8-9C6B-D6C7DFDC589F}" vid="{4A3C46E8-61CC-4603-A589-7422A47A8E4A}"/>
     </a:ext>
   </a:extLst>
 </a:theme>
@@ -11033,7 +11432,7 @@
   <a:extraClrSchemeLst/>
   <a:extLst>
     <a:ext uri="{05A4C25C-085E-4340-85A3-A5531E510DB2}">
-      <thm15:themeFamily xmlns:thm15="http://schemas.microsoft.com/office/thememl/2012/main" xmlns="" name="Office Theme" id="{62F939B6-93AF-4DB8-9C6B-D6C7DFDC589F}" vid="{4A3C46E8-61CC-4603-A589-7422A47A8E4A}"/>
+      <thm15:themeFamily xmlns:thm15="http://schemas.microsoft.com/office/thememl/2012/main" name="Office Theme" id="{62F939B6-93AF-4DB8-9C6B-D6C7DFDC589F}" vid="{4A3C46E8-61CC-4603-A589-7422A47A8E4A}"/>
     </a:ext>
   </a:extLst>
 </a:theme>

</xml_diff>